<commit_message>
Relazione e revisione presentazione
</commit_message>
<xml_diff>
--- a/writeup/Slides.pptx
+++ b/writeup/Slides.pptx
@@ -14,6 +14,7 @@
     <p:sldId id="263" r:id="rId8"/>
     <p:sldId id="264" r:id="rId9"/>
     <p:sldId id="265" r:id="rId10"/>
+    <p:sldId id="266" r:id="rId11"/>
   </p:sldIdLst>
   <p:sldSz cx="12192000" cy="6858000"/>
   <p:notesSz cx="6858000" cy="9144000"/>
@@ -126,6 +127,7 @@
             <p14:sldId id="263"/>
             <p14:sldId id="264"/>
             <p14:sldId id="265"/>
+            <p14:sldId id="266"/>
           </p14:sldIdLst>
         </p14:section>
       </p14:sectionLst>
@@ -140,10 +142,10 @@
 <file path=ppt/revisionInfo.xml><?xml version="1.0" encoding="utf-8"?>
 <p1510:revInfo xmlns:a="http://schemas.openxmlformats.org/drawingml/2006/main" xmlns:r="http://schemas.openxmlformats.org/officeDocument/2006/relationships" xmlns:p1510="http://schemas.microsoft.com/office/powerpoint/2015/10/main">
   <p1510:revLst>
+    <p1510:client id="{E9A3E667-E202-6353-A4E7-75F3F84AD1CD}" v="6" dt="2018-11-27T08:41:12.239"/>
     <p1510:client id="{AF234B7E-82A7-444F-B401-35DEC5A5F2CB}" v="86" dt="2018-11-26T21:06:46.933"/>
-    <p1510:client id="{E9A3E667-E202-6353-A4E7-75F3F84AD1CD}" v="6" dt="2018-11-27T08:41:12.239"/>
+    <p1510:client id="{987B40F4-C2A0-FF56-D036-10FC24EEC81B}" v="12" dt="2018-11-27T08:41:27.046"/>
     <p1510:client id="{7DB06895-C1A9-463A-81DF-B0E1BD81AE50}" v="54" dt="2018-11-26T21:06:41.168"/>
-    <p1510:client id="{987B40F4-C2A0-FF56-D036-10FC24EEC81B}" v="12" dt="2018-11-27T08:41:27.046"/>
     <p1510:client id="{F791663E-8F02-4097-8A90-B5990CC7961B}" v="62" dt="2018-11-27T09:06:13.711"/>
   </p1510:revLst>
 </p1510:revInfo>
@@ -296,7 +298,7 @@
           <a:p>
             <a:fld id="{2B996CD7-E6CE-470D-9D9D-A9A816181F09}" type="datetimeFigureOut">
               <a:rPr lang="it-IT" smtClean="0"/>
-              <a:t>28/11/2018</a:t>
+              <a:t>29/11/2018</a:t>
             </a:fld>
             <a:endParaRPr lang="it-IT"/>
           </a:p>
@@ -494,7 +496,7 @@
           <a:p>
             <a:fld id="{2B996CD7-E6CE-470D-9D9D-A9A816181F09}" type="datetimeFigureOut">
               <a:rPr lang="it-IT" smtClean="0"/>
-              <a:t>28/11/2018</a:t>
+              <a:t>29/11/2018</a:t>
             </a:fld>
             <a:endParaRPr lang="it-IT"/>
           </a:p>
@@ -702,7 +704,7 @@
           <a:p>
             <a:fld id="{2B996CD7-E6CE-470D-9D9D-A9A816181F09}" type="datetimeFigureOut">
               <a:rPr lang="it-IT" smtClean="0"/>
-              <a:t>28/11/2018</a:t>
+              <a:t>29/11/2018</a:t>
             </a:fld>
             <a:endParaRPr lang="it-IT"/>
           </a:p>
@@ -900,7 +902,7 @@
           <a:p>
             <a:fld id="{2B996CD7-E6CE-470D-9D9D-A9A816181F09}" type="datetimeFigureOut">
               <a:rPr lang="it-IT" smtClean="0"/>
-              <a:t>28/11/2018</a:t>
+              <a:t>29/11/2018</a:t>
             </a:fld>
             <a:endParaRPr lang="it-IT"/>
           </a:p>
@@ -1175,7 +1177,7 @@
           <a:p>
             <a:fld id="{2B996CD7-E6CE-470D-9D9D-A9A816181F09}" type="datetimeFigureOut">
               <a:rPr lang="it-IT" smtClean="0"/>
-              <a:t>28/11/2018</a:t>
+              <a:t>29/11/2018</a:t>
             </a:fld>
             <a:endParaRPr lang="it-IT"/>
           </a:p>
@@ -1440,7 +1442,7 @@
           <a:p>
             <a:fld id="{2B996CD7-E6CE-470D-9D9D-A9A816181F09}" type="datetimeFigureOut">
               <a:rPr lang="it-IT" smtClean="0"/>
-              <a:t>28/11/2018</a:t>
+              <a:t>29/11/2018</a:t>
             </a:fld>
             <a:endParaRPr lang="it-IT"/>
           </a:p>
@@ -1852,7 +1854,7 @@
           <a:p>
             <a:fld id="{2B996CD7-E6CE-470D-9D9D-A9A816181F09}" type="datetimeFigureOut">
               <a:rPr lang="it-IT" smtClean="0"/>
-              <a:t>28/11/2018</a:t>
+              <a:t>29/11/2018</a:t>
             </a:fld>
             <a:endParaRPr lang="it-IT"/>
           </a:p>
@@ -1993,7 +1995,7 @@
           <a:p>
             <a:fld id="{2B996CD7-E6CE-470D-9D9D-A9A816181F09}" type="datetimeFigureOut">
               <a:rPr lang="it-IT" smtClean="0"/>
-              <a:t>28/11/2018</a:t>
+              <a:t>29/11/2018</a:t>
             </a:fld>
             <a:endParaRPr lang="it-IT"/>
           </a:p>
@@ -2106,7 +2108,7 @@
           <a:p>
             <a:fld id="{2B996CD7-E6CE-470D-9D9D-A9A816181F09}" type="datetimeFigureOut">
               <a:rPr lang="it-IT" smtClean="0"/>
-              <a:t>28/11/2018</a:t>
+              <a:t>29/11/2018</a:t>
             </a:fld>
             <a:endParaRPr lang="it-IT"/>
           </a:p>
@@ -2417,7 +2419,7 @@
           <a:p>
             <a:fld id="{2B996CD7-E6CE-470D-9D9D-A9A816181F09}" type="datetimeFigureOut">
               <a:rPr lang="it-IT" smtClean="0"/>
-              <a:t>28/11/2018</a:t>
+              <a:t>29/11/2018</a:t>
             </a:fld>
             <a:endParaRPr lang="it-IT"/>
           </a:p>
@@ -2705,7 +2707,7 @@
           <a:p>
             <a:fld id="{2B996CD7-E6CE-470D-9D9D-A9A816181F09}" type="datetimeFigureOut">
               <a:rPr lang="it-IT" smtClean="0"/>
-              <a:t>28/11/2018</a:t>
+              <a:t>29/11/2018</a:t>
             </a:fld>
             <a:endParaRPr lang="it-IT"/>
           </a:p>
@@ -2956,7 +2958,7 @@
           <a:p>
             <a:fld id="{2B996CD7-E6CE-470D-9D9D-A9A816181F09}" type="datetimeFigureOut">
               <a:rPr lang="it-IT" smtClean="0"/>
-              <a:t>28/11/2018</a:t>
+              <a:t>29/11/2018</a:t>
             </a:fld>
             <a:endParaRPr lang="it-IT"/>
           </a:p>
@@ -3642,6 +3644,86 @@
 </p:sld>
 </file>
 
+<file path=ppt/slides/slide10.xml><?xml version="1.0" encoding="utf-8"?>
+<p:sld xmlns:a="http://schemas.openxmlformats.org/drawingml/2006/main" xmlns:r="http://schemas.openxmlformats.org/officeDocument/2006/relationships" xmlns:p="http://schemas.openxmlformats.org/presentationml/2006/main">
+  <p:cSld>
+    <p:spTree>
+      <p:nvGrpSpPr>
+        <p:cNvPr id="1" name=""/>
+        <p:cNvGrpSpPr/>
+        <p:nvPr/>
+      </p:nvGrpSpPr>
+      <p:grpSpPr>
+        <a:xfrm>
+          <a:off x="0" y="0"/>
+          <a:ext cx="0" cy="0"/>
+          <a:chOff x="0" y="0"/>
+          <a:chExt cx="0" cy="0"/>
+        </a:xfrm>
+      </p:grpSpPr>
+      <p:sp>
+        <p:nvSpPr>
+          <p:cNvPr id="2" name="Titolo 1">
+            <a:extLst>
+              <a:ext uri="{FF2B5EF4-FFF2-40B4-BE49-F238E27FC236}">
+                <a16:creationId xmlns:a16="http://schemas.microsoft.com/office/drawing/2014/main" id="{887B090B-A589-47C6-BADB-8A0D7CF3EF6A}"/>
+              </a:ext>
+            </a:extLst>
+          </p:cNvPr>
+          <p:cNvSpPr>
+            <a:spLocks noGrp="1"/>
+          </p:cNvSpPr>
+          <p:nvPr>
+            <p:ph type="title"/>
+          </p:nvPr>
+        </p:nvSpPr>
+        <p:spPr/>
+        <p:txBody>
+          <a:bodyPr/>
+          <a:lstStyle/>
+          <a:p>
+            <a:endParaRPr lang="it-IT"/>
+          </a:p>
+        </p:txBody>
+      </p:sp>
+      <p:sp>
+        <p:nvSpPr>
+          <p:cNvPr id="3" name="Segnaposto contenuto 2">
+            <a:extLst>
+              <a:ext uri="{FF2B5EF4-FFF2-40B4-BE49-F238E27FC236}">
+                <a16:creationId xmlns:a16="http://schemas.microsoft.com/office/drawing/2014/main" id="{9CDF8B6B-22BC-4BA9-A838-BD44EDA787BD}"/>
+              </a:ext>
+            </a:extLst>
+          </p:cNvPr>
+          <p:cNvSpPr>
+            <a:spLocks noGrp="1"/>
+          </p:cNvSpPr>
+          <p:nvPr>
+            <p:ph idx="1"/>
+          </p:nvPr>
+        </p:nvSpPr>
+        <p:spPr/>
+        <p:txBody>
+          <a:bodyPr/>
+          <a:lstStyle/>
+          <a:p>
+            <a:endParaRPr lang="it-IT"/>
+          </a:p>
+        </p:txBody>
+      </p:sp>
+    </p:spTree>
+    <p:extLst>
+      <p:ext uri="{BB962C8B-B14F-4D97-AF65-F5344CB8AC3E}">
+        <p14:creationId xmlns:p14="http://schemas.microsoft.com/office/powerpoint/2010/main" val="1723690821"/>
+      </p:ext>
+    </p:extLst>
+  </p:cSld>
+  <p:clrMapOvr>
+    <a:masterClrMapping/>
+  </p:clrMapOvr>
+</p:sld>
+</file>
+
 <file path=ppt/slides/slide2.xml><?xml version="1.0" encoding="utf-8"?>
 <p:sld xmlns:a="http://schemas.openxmlformats.org/drawingml/2006/main" xmlns:r="http://schemas.openxmlformats.org/officeDocument/2006/relationships" xmlns:p="http://schemas.openxmlformats.org/presentationml/2006/main">
   <p:cSld>
@@ -3824,7 +3906,7 @@
                 <a:ea typeface="Doulos SIL" panose="02000500070000020004" pitchFamily="2" charset="0"/>
                 <a:cs typeface="Doulos SIL" panose="02000500070000020004" pitchFamily="2" charset="0"/>
               </a:rPr>
-              <a:t>Ricerca del minimo</a:t>
+              <a:t>Esperimenti</a:t>
             </a:r>
           </a:p>
           <a:p>
@@ -4372,7 +4454,7 @@
             <a:r>
               <a:rPr lang="it-IT" b="1" i="1" dirty="0">
                 <a:solidFill>
-                  <a:srgbClr val="002060"/>
+                  <a:srgbClr val="C00000"/>
                 </a:solidFill>
                 <a:latin typeface="+mj-lt"/>
                 <a:ea typeface="Doulos SIL" panose="02000500070000020004" pitchFamily="2" charset="0"/>
@@ -4686,7 +4768,7 @@
             <a:r>
               <a:rPr lang="it-IT" b="1" i="1" dirty="0">
                 <a:solidFill>
-                  <a:srgbClr val="002060"/>
+                  <a:srgbClr val="C00000"/>
                 </a:solidFill>
                 <a:latin typeface="+mj-lt"/>
                 <a:ea typeface="Doulos SIL" panose="02000500070000020004" pitchFamily="2" charset="0"/>
@@ -5068,8 +5150,8 @@
           <a:chExt cx="0" cy="0"/>
         </a:xfrm>
       </p:grpSpPr>
-      <mc:AlternateContent xmlns:mc="http://schemas.openxmlformats.org/markup-compatibility/2006" xmlns:a14="http://schemas.microsoft.com/office/drawing/2010/main">
-        <mc:Choice Requires="a14">
+      <mc:AlternateContent xmlns:mc="http://schemas.openxmlformats.org/markup-compatibility/2006">
+        <mc:Choice xmlns:a14="http://schemas.microsoft.com/office/drawing/2010/main" Requires="a14">
           <p:sp>
             <p:nvSpPr>
               <p:cNvPr id="3" name="Segnaposto contenuto 2">
@@ -5102,9 +5184,7 @@
                 <a:r>
                   <a:rPr lang="it-IT" dirty="0">
                     <a:solidFill>
-                      <a:schemeClr val="accent5">
-                        <a:lumMod val="50000"/>
-                      </a:schemeClr>
+                      <a:srgbClr val="002060"/>
                     </a:solidFill>
                     <a:latin typeface="+mj-lt"/>
                     <a:ea typeface="Doulos SIL" panose="02000500070000020004" pitchFamily="2" charset="0"/>
@@ -5119,9 +5199,7 @@
                         <m:ctrlPr>
                           <a:rPr lang="it-IT" i="1" smtClean="0">
                             <a:solidFill>
-                              <a:schemeClr val="accent5">
-                                <a:lumMod val="50000"/>
-                              </a:schemeClr>
+                              <a:srgbClr val="C00000"/>
                             </a:solidFill>
                             <a:latin typeface="Cambria Math" panose="02040503050406030204" pitchFamily="18" charset="0"/>
                           </a:rPr>
@@ -5131,9 +5209,7 @@
                         <m:r>
                           <a:rPr lang="it-IT" b="0" i="1" smtClean="0">
                             <a:solidFill>
-                              <a:schemeClr val="accent5">
-                                <a:lumMod val="50000"/>
-                              </a:schemeClr>
+                              <a:srgbClr val="C00000"/>
                             </a:solidFill>
                             <a:latin typeface="Cambria Math" panose="02040503050406030204" pitchFamily="18" charset="0"/>
                           </a:rPr>
@@ -5144,9 +5220,7 @@
                         <m:r>
                           <a:rPr lang="it-IT" b="0" i="1" smtClean="0">
                             <a:solidFill>
-                              <a:schemeClr val="accent5">
-                                <a:lumMod val="50000"/>
-                              </a:schemeClr>
+                              <a:srgbClr val="C00000"/>
                             </a:solidFill>
                             <a:latin typeface="Cambria Math" panose="02040503050406030204" pitchFamily="18" charset="0"/>
                           </a:rPr>
@@ -5159,15 +5233,24 @@
                 <a:r>
                   <a:rPr lang="it-IT" dirty="0">
                     <a:solidFill>
-                      <a:schemeClr val="accent5">
-                        <a:lumMod val="50000"/>
-                      </a:schemeClr>
+                      <a:srgbClr val="C00000"/>
                     </a:solidFill>
                     <a:latin typeface="+mj-lt"/>
                     <a:ea typeface="Doulos SIL" panose="02000500070000020004" pitchFamily="2" charset="0"/>
                     <a:cs typeface="Doulos SIL" panose="02000500070000020004" pitchFamily="2" charset="0"/>
                   </a:rPr>
-                  <a:t> valori dell’asse z. La funzione campionata verrà poi normalizzata e mediata sul valor medio di </a:t>
+                  <a:t> </a:t>
+                </a:r>
+                <a:r>
+                  <a:rPr lang="it-IT" dirty="0">
+                    <a:solidFill>
+                      <a:srgbClr val="002060"/>
+                    </a:solidFill>
+                    <a:latin typeface="+mj-lt"/>
+                    <a:ea typeface="Doulos SIL" panose="02000500070000020004" pitchFamily="2" charset="0"/>
+                    <a:cs typeface="Doulos SIL" panose="02000500070000020004" pitchFamily="2" charset="0"/>
+                  </a:rPr>
+                  <a:t>valori dell’asse z. La funzione campionata verrà poi normalizzata e mediata sul valor medio di </a:t>
                 </a:r>
                 <a14:m>
                   <m:oMath xmlns:m="http://schemas.openxmlformats.org/officeDocument/2006/math">
@@ -5175,11 +5258,9 @@
                       <m:accPr>
                         <m:chr m:val="̃"/>
                         <m:ctrlPr>
-                          <a:rPr lang="it-IT" i="1">
+                          <a:rPr lang="it-IT" i="1" smtClean="0">
                             <a:solidFill>
-                              <a:schemeClr val="accent5">
-                                <a:lumMod val="50000"/>
-                              </a:schemeClr>
+                              <a:srgbClr val="C00000"/>
                             </a:solidFill>
                             <a:latin typeface="Cambria Math" panose="02040503050406030204" pitchFamily="18" charset="0"/>
                           </a:rPr>
@@ -5189,9 +5270,7 @@
                         <m:r>
                           <a:rPr lang="it-IT" i="1">
                             <a:solidFill>
-                              <a:schemeClr val="accent5">
-                                <a:lumMod val="50000"/>
-                              </a:schemeClr>
+                              <a:srgbClr val="C00000"/>
                             </a:solidFill>
                             <a:latin typeface="Cambria Math" panose="02040503050406030204" pitchFamily="18" charset="0"/>
                           </a:rPr>
@@ -5204,22 +5283,29 @@
                 <a:r>
                   <a:rPr lang="it-IT" i="1" dirty="0">
                     <a:solidFill>
-                      <a:schemeClr val="accent5">
-                        <a:lumMod val="50000"/>
-                      </a:schemeClr>
+                      <a:srgbClr val="C00000"/>
                     </a:solidFill>
                     <a:latin typeface="+mj-lt"/>
                     <a:ea typeface="Doulos SIL" panose="02000500070000020004" pitchFamily="2" charset="0"/>
                     <a:cs typeface="Doulos SIL" panose="02000500070000020004" pitchFamily="2" charset="0"/>
                   </a:rPr>
-                  <a:t>z.</a:t>
+                  <a:t>z</a:t>
+                </a:r>
+                <a:r>
+                  <a:rPr lang="it-IT" i="1" dirty="0">
+                    <a:solidFill>
+                      <a:srgbClr val="002060"/>
+                    </a:solidFill>
+                    <a:latin typeface="+mj-lt"/>
+                    <a:ea typeface="Doulos SIL" panose="02000500070000020004" pitchFamily="2" charset="0"/>
+                    <a:cs typeface="Doulos SIL" panose="02000500070000020004" pitchFamily="2" charset="0"/>
+                  </a:rPr>
+                  <a:t>.</a:t>
                 </a:r>
                 <a:r>
                   <a:rPr lang="it-IT" dirty="0">
                     <a:solidFill>
-                      <a:schemeClr val="accent5">
-                        <a:lumMod val="50000"/>
-                      </a:schemeClr>
+                      <a:srgbClr val="002060"/>
                     </a:solidFill>
                     <a:latin typeface="+mj-lt"/>
                     <a:ea typeface="Doulos SIL" panose="02000500070000020004" pitchFamily="2" charset="0"/>
@@ -5231,7 +5317,7 @@
             </p:txBody>
           </p:sp>
         </mc:Choice>
-        <mc:Fallback xmlns="">
+        <mc:Fallback>
           <p:sp>
             <p:nvSpPr>
               <p:cNvPr id="3" name="Segnaposto contenuto 2">
@@ -5530,7 +5616,7 @@
             <a:r>
               <a:rPr lang="it-IT" b="1" i="1" dirty="0">
                 <a:solidFill>
-                  <a:srgbClr val="002060"/>
+                  <a:srgbClr val="C00000"/>
                 </a:solidFill>
                 <a:latin typeface="+mj-lt"/>
                 <a:ea typeface="Doulos SIL" panose="02000500070000020004" pitchFamily="2" charset="0"/>
@@ -5807,53 +5893,6 @@
           <a:chExt cx="0" cy="0"/>
         </a:xfrm>
       </p:grpSpPr>
-      <p:sp>
-        <p:nvSpPr>
-          <p:cNvPr id="3" name="CasellaDiTesto 2">
-            <a:extLst>
-              <a:ext uri="{FF2B5EF4-FFF2-40B4-BE49-F238E27FC236}">
-                <a16:creationId xmlns:a16="http://schemas.microsoft.com/office/drawing/2014/main" id="{550CCBAB-D720-469D-9AAA-D5AF752E1F7C}"/>
-              </a:ext>
-            </a:extLst>
-          </p:cNvPr>
-          <p:cNvSpPr txBox="1"/>
-          <p:nvPr/>
-        </p:nvSpPr>
-        <p:spPr>
-          <a:xfrm>
-            <a:off x="711707" y="1484321"/>
-            <a:ext cx="3865536" cy="830997"/>
-          </a:xfrm>
-          <a:prstGeom prst="rect">
-            <a:avLst/>
-          </a:prstGeom>
-          <a:noFill/>
-        </p:spPr>
-        <p:txBody>
-          <a:bodyPr wrap="square" rtlCol="0">
-            <a:spAutoFit/>
-          </a:bodyPr>
-          <a:lstStyle/>
-          <a:p>
-            <a:r>
-              <a:rPr lang="it-IT" sz="2400" dirty="0">
-                <a:solidFill>
-                  <a:srgbClr val="002060"/>
-                </a:solidFill>
-              </a:rPr>
-              <a:t>METTERE UNA SPIEGAZIONE MIGLIORE E SUCCINTA</a:t>
-            </a:r>
-            <a:endParaRPr lang="it-IT" sz="2400" dirty="0">
-              <a:solidFill>
-                <a:srgbClr val="002060"/>
-              </a:solidFill>
-              <a:latin typeface="Doulos SIL" panose="02000500070000020004" pitchFamily="2" charset="0"/>
-              <a:ea typeface="Doulos SIL" panose="02000500070000020004" pitchFamily="2" charset="0"/>
-              <a:cs typeface="Doulos SIL" panose="02000500070000020004" pitchFamily="2" charset="0"/>
-            </a:endParaRPr>
-          </a:p>
-        </p:txBody>
-      </p:sp>
       <p:pic>
         <p:nvPicPr>
           <p:cNvPr id="5" name="Immagine 4">
@@ -5882,8 +5921,8 @@
         </p:blipFill>
         <p:spPr>
           <a:xfrm>
-            <a:off x="4459797" y="1293491"/>
-            <a:ext cx="7664060" cy="2357123"/>
+            <a:off x="3980075" y="1182707"/>
+            <a:ext cx="8143783" cy="2357123"/>
           </a:xfrm>
           <a:prstGeom prst="rect">
             <a:avLst/>
@@ -5918,8 +5957,8 @@
         </p:blipFill>
         <p:spPr>
           <a:xfrm>
-            <a:off x="4459796" y="3477087"/>
-            <a:ext cx="7664062" cy="2655259"/>
+            <a:off x="3980075" y="3429000"/>
+            <a:ext cx="8143783" cy="2821461"/>
           </a:xfrm>
           <a:prstGeom prst="rect">
             <a:avLst/>
@@ -6057,7 +6096,83 @@
                 <a:ea typeface="Doulos SIL" panose="02000500070000020004" pitchFamily="2" charset="0"/>
                 <a:cs typeface="Doulos SIL" panose="02000500070000020004" pitchFamily="2" charset="0"/>
               </a:rPr>
-              <a:t>Esperimento: 3D senza vincoli</a:t>
+              <a:t>5. Esperimento: 3D senza vincoli</a:t>
+            </a:r>
+          </a:p>
+        </p:txBody>
+      </p:sp>
+      <p:sp>
+        <p:nvSpPr>
+          <p:cNvPr id="2" name="CasellaDiTesto 1">
+            <a:extLst>
+              <a:ext uri="{FF2B5EF4-FFF2-40B4-BE49-F238E27FC236}">
+                <a16:creationId xmlns:a16="http://schemas.microsoft.com/office/drawing/2014/main" id="{5F45F277-79BC-4709-8BCD-92552CDA27AD}"/>
+              </a:ext>
+            </a:extLst>
+          </p:cNvPr>
+          <p:cNvSpPr txBox="1"/>
+          <p:nvPr/>
+        </p:nvSpPr>
+        <p:spPr>
+          <a:xfrm>
+            <a:off x="823911" y="1713388"/>
+            <a:ext cx="2940222" cy="3539430"/>
+          </a:xfrm>
+          <a:prstGeom prst="rect">
+            <a:avLst/>
+          </a:prstGeom>
+          <a:noFill/>
+        </p:spPr>
+        <p:txBody>
+          <a:bodyPr wrap="square" rtlCol="0">
+            <a:spAutoFit/>
+          </a:bodyPr>
+          <a:lstStyle/>
+          <a:p>
+            <a:r>
+              <a:rPr lang="it-IT" sz="2800" dirty="0">
+                <a:solidFill>
+                  <a:srgbClr val="002060"/>
+                </a:solidFill>
+                <a:latin typeface="+mj-lt"/>
+              </a:rPr>
+              <a:t>In questo test, l’algoritmo si ferma quando la percentuale di errore scende al di sotto del valore di </a:t>
+            </a:r>
+            <a:r>
+              <a:rPr lang="it-IT" sz="2800" b="1" dirty="0">
+                <a:solidFill>
+                  <a:srgbClr val="C00000"/>
+                </a:solidFill>
+                <a:latin typeface="+mj-lt"/>
+              </a:rPr>
+              <a:t>tolleranza</a:t>
+            </a:r>
+            <a:r>
+              <a:rPr lang="it-IT" sz="2800" dirty="0">
+                <a:solidFill>
+                  <a:srgbClr val="C00000"/>
+                </a:solidFill>
+                <a:latin typeface="+mj-lt"/>
+              </a:rPr>
+              <a:t> </a:t>
+            </a:r>
+            <a:r>
+              <a:rPr lang="it-IT" sz="2800" b="1" dirty="0">
+                <a:solidFill>
+                  <a:srgbClr val="C00000"/>
+                </a:solidFill>
+                <a:latin typeface="+mj-lt"/>
+              </a:rPr>
+              <a:t>ammesso</a:t>
+            </a:r>
+            <a:r>
+              <a:rPr lang="it-IT" sz="2800" dirty="0">
+                <a:solidFill>
+                  <a:srgbClr val="002060"/>
+                </a:solidFill>
+                <a:latin typeface="+mj-lt"/>
+              </a:rPr>
+              <a:t>. </a:t>
             </a:r>
           </a:p>
         </p:txBody>
@@ -6125,8 +6240,8 @@
         </p:nvSpPr>
         <p:spPr>
           <a:xfrm>
-            <a:off x="938212" y="1271319"/>
-            <a:ext cx="3790950" cy="4900380"/>
+            <a:off x="938212" y="1502713"/>
+            <a:ext cx="3402969" cy="4493819"/>
           </a:xfrm>
         </p:spPr>
         <p:txBody>
@@ -6139,13 +6254,43 @@
               <a:buNone/>
             </a:pPr>
             <a:r>
-              <a:rPr lang="it-IT" b="1" dirty="0">
+              <a:rPr lang="it-IT" dirty="0">
                 <a:solidFill>
                   <a:srgbClr val="002060"/>
                 </a:solidFill>
-                <a:latin typeface="+mj-lt"/>
-              </a:rPr>
-              <a:t>SPIEGAZIONE MIGLIORE ????</a:t>
+              </a:rPr>
+              <a:t>Valutiamo i risultati  in presenza di un vincolo di disuguaglianza </a:t>
+            </a:r>
+            <a:r>
+              <a:rPr lang="it-IT" i="1" dirty="0">
+                <a:solidFill>
+                  <a:srgbClr val="C00000"/>
+                </a:solidFill>
+              </a:rPr>
+              <a:t>R ≤ 2Z</a:t>
+            </a:r>
+            <a:r>
+              <a:rPr lang="it-IT" dirty="0">
+                <a:solidFill>
+                  <a:srgbClr val="002060"/>
+                </a:solidFill>
+              </a:rPr>
+              <a:t>. </a:t>
+            </a:r>
+            <a:br>
+              <a:rPr lang="it-IT" dirty="0">
+                <a:solidFill>
+                  <a:srgbClr val="002060"/>
+                </a:solidFill>
+              </a:rPr>
+            </a:br>
+            <a:r>
+              <a:rPr lang="it-IT" dirty="0">
+                <a:solidFill>
+                  <a:srgbClr val="002060"/>
+                </a:solidFill>
+              </a:rPr>
+              <a:t>Così come ci aspettavamo la percentuale di errore aumenta drasticamente.</a:t>
             </a:r>
           </a:p>
         </p:txBody>
@@ -6315,7 +6460,7 @@
                 <a:ea typeface="Doulos SIL" panose="02000500070000020004" pitchFamily="2" charset="0"/>
                 <a:cs typeface="Doulos SIL" panose="02000500070000020004" pitchFamily="2" charset="0"/>
               </a:rPr>
-              <a:t>Esperimento: 3D con vincolo di disuguaglianza</a:t>
+              <a:t>5. Esperimento: 3D con vincolo di disuguaglianza</a:t>
             </a:r>
           </a:p>
         </p:txBody>

</xml_diff>

<commit_message>
pallino blu scritta rossa TOP
</commit_message>
<xml_diff>
--- a/writeup/Slides.pptx
+++ b/writeup/Slides.pptx
@@ -148,10 +148,10 @@
 <file path=ppt/revisionInfo.xml><?xml version="1.0" encoding="utf-8"?>
 <p1510:revInfo xmlns:a="http://schemas.openxmlformats.org/drawingml/2006/main" xmlns:r="http://schemas.openxmlformats.org/officeDocument/2006/relationships" xmlns:p1510="http://schemas.microsoft.com/office/powerpoint/2015/10/main">
   <p1510:revLst>
+    <p1510:client id="{AF234B7E-82A7-444F-B401-35DEC5A5F2CB}" v="86" dt="2018-11-26T21:06:46.933"/>
     <p1510:client id="{E9A3E667-E202-6353-A4E7-75F3F84AD1CD}" v="6" dt="2018-11-27T08:41:12.239"/>
-    <p1510:client id="{AF234B7E-82A7-444F-B401-35DEC5A5F2CB}" v="86" dt="2018-11-26T21:06:46.933"/>
+    <p1510:client id="{7DB06895-C1A9-463A-81DF-B0E1BD81AE50}" v="54" dt="2018-11-26T21:06:41.168"/>
     <p1510:client id="{987B40F4-C2A0-FF56-D036-10FC24EEC81B}" v="12" dt="2018-11-27T08:41:27.046"/>
-    <p1510:client id="{7DB06895-C1A9-463A-81DF-B0E1BD81AE50}" v="54" dt="2018-11-26T21:06:41.168"/>
     <p1510:client id="{F791663E-8F02-4097-8A90-B5990CC7961B}" v="62" dt="2018-11-27T09:06:13.711"/>
   </p1510:revLst>
 </p1510:revInfo>
@@ -6625,12 +6625,10 @@
                 <a:ea typeface="Doulos SIL" panose="02000500070000020004" pitchFamily="2" charset="0"/>
                 <a:cs typeface="Doulos SIL" panose="02000500070000020004" pitchFamily="2" charset="0"/>
               </a:rPr>
-              <a:t>Implementazione in MATLAB</a:t>
-            </a:r>
-          </a:p>
-          <a:p>
-            <a:r>
-              <a:rPr lang="it-IT" b="1" i="1" dirty="0">
+              <a:t>Implementazione in </a:t>
+            </a:r>
+            <a:r>
+              <a:rPr lang="it-IT" dirty="0" smtClean="0">
                 <a:solidFill>
                   <a:srgbClr val="002060"/>
                 </a:solidFill>
@@ -6638,7 +6636,42 @@
                 <a:ea typeface="Doulos SIL" panose="02000500070000020004" pitchFamily="2" charset="0"/>
                 <a:cs typeface="Doulos SIL" panose="02000500070000020004" pitchFamily="2" charset="0"/>
               </a:rPr>
-              <a:t>Caratteristiche:</a:t>
+              <a:t>MATLAB</a:t>
+            </a:r>
+          </a:p>
+          <a:p>
+            <a:r>
+              <a:rPr lang="it-IT" b="1" i="1" dirty="0">
+                <a:solidFill>
+                  <a:srgbClr val="002060"/>
+                </a:solidFill>
+                <a:latin typeface="+mj-lt"/>
+                <a:ea typeface="Doulos SIL" panose="02000500070000020004" pitchFamily="2" charset="0"/>
+                <a:cs typeface="Doulos SIL" panose="02000500070000020004" pitchFamily="2" charset="0"/>
+              </a:rPr>
+              <a:t> </a:t>
+            </a:r>
+            <a:r>
+              <a:rPr lang="it-IT" b="1" i="1" dirty="0" smtClean="0">
+                <a:solidFill>
+                  <a:srgbClr val="C00000"/>
+                </a:solidFill>
+                <a:latin typeface="+mj-lt"/>
+                <a:ea typeface="Doulos SIL" panose="02000500070000020004" pitchFamily="2" charset="0"/>
+                <a:cs typeface="Doulos SIL" panose="02000500070000020004" pitchFamily="2" charset="0"/>
+              </a:rPr>
+              <a:t>Caratteristiche</a:t>
+            </a:r>
+            <a:r>
+              <a:rPr lang="it-IT" b="1" i="1" dirty="0">
+                <a:solidFill>
+                  <a:srgbClr val="002060"/>
+                </a:solidFill>
+                <a:latin typeface="+mj-lt"/>
+                <a:ea typeface="Doulos SIL" panose="02000500070000020004" pitchFamily="2" charset="0"/>
+                <a:cs typeface="Doulos SIL" panose="02000500070000020004" pitchFamily="2" charset="0"/>
+              </a:rPr>
+              <a:t>:</a:t>
             </a:r>
             <a:r>
               <a:rPr lang="it-IT" dirty="0">

</xml_diff>

<commit_message>
Non è mai la fine
</commit_message>
<xml_diff>
--- a/writeup/Slides.pptx
+++ b/writeup/Slides.pptx
@@ -165,9 +165,9 @@
 <p1510:revInfo xmlns:a="http://schemas.openxmlformats.org/drawingml/2006/main" xmlns:r="http://schemas.openxmlformats.org/officeDocument/2006/relationships" xmlns:p1510="http://schemas.microsoft.com/office/powerpoint/2015/10/main">
   <p1510:revLst>
     <p1510:client id="{84FA5B88-F502-465F-ACC7-B7F033E01A7E}" v="316" dt="2018-12-03T21:06:04.939"/>
+    <p1510:client id="{F5E20A4E-8911-3E51-843F-2BA95DB8A042}" v="24" dt="2018-12-03T22:13:51.207"/>
+    <p1510:client id="{7AD5030A-0C67-41A6-858C-383DC736EF4C}" v="138" dt="2018-12-03T20:56:55.360"/>
     <p1510:client id="{10F92BBE-6513-4C7B-0321-95D3B136DA99}" v="1" dt="2018-12-03T23:17:59.267"/>
-    <p1510:client id="{7AD5030A-0C67-41A6-858C-383DC736EF4C}" v="138" dt="2018-12-03T20:56:55.360"/>
-    <p1510:client id="{F5E20A4E-8911-3E51-843F-2BA95DB8A042}" v="24" dt="2018-12-03T22:13:51.207"/>
     <p1510:client id="{B86D841B-CFA6-4940-9543-14A01CCDC4E9}" v="20" dt="2018-12-03T21:21:49.560"/>
     <p1510:client id="{28CE7897-7DD4-B384-ED67-5DAB5D70B2F6}" v="181" dt="2018-12-03T23:45:00.352"/>
   </p1510:revLst>
@@ -9141,36 +9141,6 @@
           </a:fontRef>
         </p:style>
       </p:cxnSp>
-      <p:pic>
-        <p:nvPicPr>
-          <p:cNvPr id="4" name="Immagine 4" descr="Immagine che contiene screenshot&#10;&#10;Descrizione generata con affidabilità elevata">
-            <a:extLst>
-              <a:ext uri="{FF2B5EF4-FFF2-40B4-BE49-F238E27FC236}">
-                <a16:creationId xmlns:a16="http://schemas.microsoft.com/office/drawing/2014/main" id="{28C0B90C-E059-4006-B306-1E699EE8E077}"/>
-              </a:ext>
-            </a:extLst>
-          </p:cNvPr>
-          <p:cNvPicPr>
-            <a:picLocks noChangeAspect="1"/>
-          </p:cNvPicPr>
-          <p:nvPr/>
-        </p:nvPicPr>
-        <p:blipFill>
-          <a:blip r:embed="rId3"/>
-          <a:stretch>
-            <a:fillRect/>
-          </a:stretch>
-        </p:blipFill>
-        <p:spPr>
-          <a:xfrm>
-            <a:off x="5482205" y="1350213"/>
-            <a:ext cx="6408712" cy="2372178"/>
-          </a:xfrm>
-          <a:prstGeom prst="rect">
-            <a:avLst/>
-          </a:prstGeom>
-        </p:spPr>
-      </p:pic>
       <p:sp>
         <p:nvSpPr>
           <p:cNvPr id="10" name="Rettangolo 9">
@@ -9454,7 +9424,7 @@
           <p:nvPr/>
         </p:nvPicPr>
         <p:blipFill>
-          <a:blip r:embed="rId4"/>
+          <a:blip r:embed="rId3"/>
           <a:stretch>
             <a:fillRect/>
           </a:stretch>
@@ -9463,6 +9433,36 @@
           <a:xfrm>
             <a:off x="3569110" y="3977741"/>
             <a:ext cx="8323006" cy="2417549"/>
+          </a:xfrm>
+          <a:prstGeom prst="rect">
+            <a:avLst/>
+          </a:prstGeom>
+        </p:spPr>
+      </p:pic>
+      <p:pic>
+        <p:nvPicPr>
+          <p:cNvPr id="3" name="Immagine 2">
+            <a:extLst>
+              <a:ext uri="{FF2B5EF4-FFF2-40B4-BE49-F238E27FC236}">
+                <a16:creationId xmlns:a16="http://schemas.microsoft.com/office/drawing/2014/main" id="{B36B7F60-D9B4-4068-BA89-CB80D9EEAC02}"/>
+              </a:ext>
+            </a:extLst>
+          </p:cNvPr>
+          <p:cNvPicPr>
+            <a:picLocks noChangeAspect="1"/>
+          </p:cNvPicPr>
+          <p:nvPr/>
+        </p:nvPicPr>
+        <p:blipFill>
+          <a:blip r:embed="rId4"/>
+          <a:stretch>
+            <a:fillRect/>
+          </a:stretch>
+        </p:blipFill>
+        <p:spPr>
+          <a:xfrm>
+            <a:off x="5513033" y="1348263"/>
+            <a:ext cx="6379083" cy="2451640"/>
           </a:xfrm>
           <a:prstGeom prst="rect">
             <a:avLst/>

</xml_diff>